<commit_message>
add pictures to slides 2
</commit_message>
<xml_diff>
--- a/המסכם.pptx
+++ b/המסכם.pptx
@@ -5,10 +5,10 @@
     <p:sldMasterId id="2147483648" r:id="rId1"/>
   </p:sldMasterIdLst>
   <p:notesMasterIdLst>
-    <p:notesMasterId r:id="rId12"/>
+    <p:notesMasterId r:id="rId17"/>
   </p:notesMasterIdLst>
   <p:handoutMasterIdLst>
-    <p:handoutMasterId r:id="rId13"/>
+    <p:handoutMasterId r:id="rId18"/>
   </p:handoutMasterIdLst>
   <p:sldIdLst>
     <p:sldId id="256" r:id="rId2"/>
@@ -21,6 +21,11 @@
     <p:sldId id="262" r:id="rId9"/>
     <p:sldId id="265" r:id="rId10"/>
     <p:sldId id="263" r:id="rId11"/>
+    <p:sldId id="266" r:id="rId12"/>
+    <p:sldId id="267" r:id="rId13"/>
+    <p:sldId id="268" r:id="rId14"/>
+    <p:sldId id="269" r:id="rId15"/>
+    <p:sldId id="270" r:id="rId16"/>
   </p:sldIdLst>
   <p:sldSz cx="12192000" cy="6858000"/>
   <p:notesSz cx="6858000" cy="9144000"/>
@@ -4139,6 +4144,614 @@
     <p:extLst>
       <p:ext uri="{BB962C8B-B14F-4D97-AF65-F5344CB8AC3E}">
         <p14:creationId xmlns:p14="http://schemas.microsoft.com/office/powerpoint/2010/main" val="3951538614"/>
+      </p:ext>
+    </p:extLst>
+  </p:cSld>
+  <p:clrMapOvr>
+    <a:masterClrMapping/>
+  </p:clrMapOvr>
+</p:sld>
+</file>
+
+<file path=ppt/slides/slide11.xml><?xml version="1.0" encoding="utf-8"?>
+<p:sld xmlns:a="http://schemas.openxmlformats.org/drawingml/2006/main" xmlns:r="http://schemas.openxmlformats.org/officeDocument/2006/relationships" xmlns:p="http://schemas.openxmlformats.org/presentationml/2006/main">
+  <p:cSld>
+    <p:spTree>
+      <p:nvGrpSpPr>
+        <p:cNvPr id="1" name=""/>
+        <p:cNvGrpSpPr/>
+        <p:nvPr/>
+      </p:nvGrpSpPr>
+      <p:grpSpPr>
+        <a:xfrm>
+          <a:off x="0" y="0"/>
+          <a:ext cx="0" cy="0"/>
+          <a:chOff x="0" y="0"/>
+          <a:chExt cx="0" cy="0"/>
+        </a:xfrm>
+      </p:grpSpPr>
+      <p:sp>
+        <p:nvSpPr>
+          <p:cNvPr id="2" name="כותרת 1">
+            <a:extLst>
+              <a:ext uri="{FF2B5EF4-FFF2-40B4-BE49-F238E27FC236}">
+                <a16:creationId xmlns:a16="http://schemas.microsoft.com/office/drawing/2014/main" id="{DD99027F-423B-439E-97A2-F88A190FB00E}"/>
+              </a:ext>
+            </a:extLst>
+          </p:cNvPr>
+          <p:cNvSpPr>
+            <a:spLocks noGrp="1"/>
+          </p:cNvSpPr>
+          <p:nvPr>
+            <p:ph type="title"/>
+          </p:nvPr>
+        </p:nvSpPr>
+        <p:spPr/>
+        <p:txBody>
+          <a:bodyPr/>
+          <a:lstStyle/>
+          <a:p>
+            <a:r>
+              <a:rPr lang="he-IL" dirty="0"/>
+              <a:t>תיאור המערכת בפועל</a:t>
+            </a:r>
+          </a:p>
+        </p:txBody>
+      </p:sp>
+      <p:sp>
+        <p:nvSpPr>
+          <p:cNvPr id="3" name="מציין מיקום תוכן 2">
+            <a:extLst>
+              <a:ext uri="{FF2B5EF4-FFF2-40B4-BE49-F238E27FC236}">
+                <a16:creationId xmlns:a16="http://schemas.microsoft.com/office/drawing/2014/main" id="{9325CB5E-2AED-432B-B9CE-8A32063F3D98}"/>
+              </a:ext>
+            </a:extLst>
+          </p:cNvPr>
+          <p:cNvSpPr>
+            <a:spLocks noGrp="1"/>
+          </p:cNvSpPr>
+          <p:nvPr>
+            <p:ph idx="1"/>
+          </p:nvPr>
+        </p:nvSpPr>
+        <p:spPr/>
+        <p:txBody>
+          <a:bodyPr/>
+          <a:lstStyle/>
+          <a:p>
+            <a:endParaRPr lang="he-IL"/>
+          </a:p>
+        </p:txBody>
+      </p:sp>
+      <p:sp>
+        <p:nvSpPr>
+          <p:cNvPr id="4" name="מציין מיקום של תאריך 3">
+            <a:extLst>
+              <a:ext uri="{FF2B5EF4-FFF2-40B4-BE49-F238E27FC236}">
+                <a16:creationId xmlns:a16="http://schemas.microsoft.com/office/drawing/2014/main" id="{52DCD12D-6DB1-49E2-AEA4-ACF5B5BF6E96}"/>
+              </a:ext>
+            </a:extLst>
+          </p:cNvPr>
+          <p:cNvSpPr>
+            <a:spLocks noGrp="1"/>
+          </p:cNvSpPr>
+          <p:nvPr>
+            <p:ph type="dt" sz="half" idx="10"/>
+          </p:nvPr>
+        </p:nvSpPr>
+        <p:spPr>
+          <a:xfrm>
+            <a:off x="8610600" y="489596"/>
+            <a:ext cx="2743200" cy="365125"/>
+          </a:xfrm>
+        </p:spPr>
+        <p:txBody>
+          <a:bodyPr/>
+          <a:lstStyle/>
+          <a:p>
+            <a:r>
+              <a:rPr lang="he-IL" dirty="0"/>
+              <a:t>בס"ד</a:t>
+            </a:r>
+          </a:p>
+        </p:txBody>
+      </p:sp>
+    </p:spTree>
+    <p:extLst>
+      <p:ext uri="{BB962C8B-B14F-4D97-AF65-F5344CB8AC3E}">
+        <p14:creationId xmlns:p14="http://schemas.microsoft.com/office/powerpoint/2010/main" val="2753062504"/>
+      </p:ext>
+    </p:extLst>
+  </p:cSld>
+  <p:clrMapOvr>
+    <a:masterClrMapping/>
+  </p:clrMapOvr>
+</p:sld>
+</file>
+
+<file path=ppt/slides/slide12.xml><?xml version="1.0" encoding="utf-8"?>
+<p:sld xmlns:a="http://schemas.openxmlformats.org/drawingml/2006/main" xmlns:r="http://schemas.openxmlformats.org/officeDocument/2006/relationships" xmlns:p="http://schemas.openxmlformats.org/presentationml/2006/main">
+  <p:cSld>
+    <p:spTree>
+      <p:nvGrpSpPr>
+        <p:cNvPr id="1" name=""/>
+        <p:cNvGrpSpPr/>
+        <p:nvPr/>
+      </p:nvGrpSpPr>
+      <p:grpSpPr>
+        <a:xfrm>
+          <a:off x="0" y="0"/>
+          <a:ext cx="0" cy="0"/>
+          <a:chOff x="0" y="0"/>
+          <a:chExt cx="0" cy="0"/>
+        </a:xfrm>
+      </p:grpSpPr>
+      <p:sp>
+        <p:nvSpPr>
+          <p:cNvPr id="2" name="כותרת 1">
+            <a:extLst>
+              <a:ext uri="{FF2B5EF4-FFF2-40B4-BE49-F238E27FC236}">
+                <a16:creationId xmlns:a16="http://schemas.microsoft.com/office/drawing/2014/main" id="{ED6D234D-5824-4A48-82FF-F3729E71EEB6}"/>
+              </a:ext>
+            </a:extLst>
+          </p:cNvPr>
+          <p:cNvSpPr>
+            <a:spLocks noGrp="1"/>
+          </p:cNvSpPr>
+          <p:nvPr>
+            <p:ph type="title"/>
+          </p:nvPr>
+        </p:nvSpPr>
+        <p:spPr/>
+        <p:txBody>
+          <a:bodyPr/>
+          <a:lstStyle/>
+          <a:p>
+            <a:endParaRPr lang="he-IL"/>
+          </a:p>
+        </p:txBody>
+      </p:sp>
+      <p:pic>
+        <p:nvPicPr>
+          <p:cNvPr id="6" name="מציין מיקום תוכן 5">
+            <a:extLst>
+              <a:ext uri="{FF2B5EF4-FFF2-40B4-BE49-F238E27FC236}">
+                <a16:creationId xmlns:a16="http://schemas.microsoft.com/office/drawing/2014/main" id="{51E8B0B2-4D74-4A22-BF4C-B742C096CFFD}"/>
+              </a:ext>
+            </a:extLst>
+          </p:cNvPr>
+          <p:cNvPicPr>
+            <a:picLocks noGrp="1" noChangeAspect="1"/>
+          </p:cNvPicPr>
+          <p:nvPr>
+            <p:ph idx="1"/>
+          </p:nvPr>
+        </p:nvPicPr>
+        <p:blipFill>
+          <a:blip r:embed="rId2">
+            <a:extLst>
+              <a:ext uri="{28A0092B-C50C-407E-A947-70E740481C1C}">
+                <a14:useLocalDpi xmlns:a14="http://schemas.microsoft.com/office/drawing/2010/main" val="0"/>
+              </a:ext>
+            </a:extLst>
+          </a:blip>
+          <a:stretch>
+            <a:fillRect/>
+          </a:stretch>
+        </p:blipFill>
+        <p:spPr>
+          <a:xfrm>
+            <a:off x="1711099" y="1912036"/>
+            <a:ext cx="8769801" cy="4178515"/>
+          </a:xfrm>
+        </p:spPr>
+      </p:pic>
+      <p:sp>
+        <p:nvSpPr>
+          <p:cNvPr id="4" name="מציין מיקום של תאריך 3">
+            <a:extLst>
+              <a:ext uri="{FF2B5EF4-FFF2-40B4-BE49-F238E27FC236}">
+                <a16:creationId xmlns:a16="http://schemas.microsoft.com/office/drawing/2014/main" id="{AD6A681D-F4C0-490E-B2DD-34BF173F392A}"/>
+              </a:ext>
+            </a:extLst>
+          </p:cNvPr>
+          <p:cNvSpPr>
+            <a:spLocks noGrp="1"/>
+          </p:cNvSpPr>
+          <p:nvPr>
+            <p:ph type="dt" sz="half" idx="10"/>
+          </p:nvPr>
+        </p:nvSpPr>
+        <p:spPr>
+          <a:xfrm>
+            <a:off x="8610600" y="365125"/>
+            <a:ext cx="2743200" cy="365125"/>
+          </a:xfrm>
+        </p:spPr>
+        <p:txBody>
+          <a:bodyPr/>
+          <a:lstStyle/>
+          <a:p>
+            <a:r>
+              <a:rPr lang="he-IL" dirty="0"/>
+              <a:t>בס"ד</a:t>
+            </a:r>
+          </a:p>
+        </p:txBody>
+      </p:sp>
+    </p:spTree>
+    <p:extLst>
+      <p:ext uri="{BB962C8B-B14F-4D97-AF65-F5344CB8AC3E}">
+        <p14:creationId xmlns:p14="http://schemas.microsoft.com/office/powerpoint/2010/main" val="1039253759"/>
+      </p:ext>
+    </p:extLst>
+  </p:cSld>
+  <p:clrMapOvr>
+    <a:masterClrMapping/>
+  </p:clrMapOvr>
+</p:sld>
+</file>
+
+<file path=ppt/slides/slide13.xml><?xml version="1.0" encoding="utf-8"?>
+<p:sld xmlns:a="http://schemas.openxmlformats.org/drawingml/2006/main" xmlns:r="http://schemas.openxmlformats.org/officeDocument/2006/relationships" xmlns:p="http://schemas.openxmlformats.org/presentationml/2006/main">
+  <p:cSld>
+    <p:spTree>
+      <p:nvGrpSpPr>
+        <p:cNvPr id="1" name=""/>
+        <p:cNvGrpSpPr/>
+        <p:nvPr/>
+      </p:nvGrpSpPr>
+      <p:grpSpPr>
+        <a:xfrm>
+          <a:off x="0" y="0"/>
+          <a:ext cx="0" cy="0"/>
+          <a:chOff x="0" y="0"/>
+          <a:chExt cx="0" cy="0"/>
+        </a:xfrm>
+      </p:grpSpPr>
+      <p:sp>
+        <p:nvSpPr>
+          <p:cNvPr id="2" name="כותרת 1">
+            <a:extLst>
+              <a:ext uri="{FF2B5EF4-FFF2-40B4-BE49-F238E27FC236}">
+                <a16:creationId xmlns:a16="http://schemas.microsoft.com/office/drawing/2014/main" id="{308778D4-907B-4077-A62A-5E016E951A8F}"/>
+              </a:ext>
+            </a:extLst>
+          </p:cNvPr>
+          <p:cNvSpPr>
+            <a:spLocks noGrp="1"/>
+          </p:cNvSpPr>
+          <p:nvPr>
+            <p:ph type="title"/>
+          </p:nvPr>
+        </p:nvSpPr>
+        <p:spPr/>
+        <p:txBody>
+          <a:bodyPr/>
+          <a:lstStyle/>
+          <a:p>
+            <a:endParaRPr lang="he-IL"/>
+          </a:p>
+        </p:txBody>
+      </p:sp>
+      <p:pic>
+        <p:nvPicPr>
+          <p:cNvPr id="6" name="מציין מיקום תוכן 5">
+            <a:extLst>
+              <a:ext uri="{FF2B5EF4-FFF2-40B4-BE49-F238E27FC236}">
+                <a16:creationId xmlns:a16="http://schemas.microsoft.com/office/drawing/2014/main" id="{EFE211FA-F7E9-488C-822B-E82D7BEED085}"/>
+              </a:ext>
+            </a:extLst>
+          </p:cNvPr>
+          <p:cNvPicPr>
+            <a:picLocks noGrp="1" noChangeAspect="1"/>
+          </p:cNvPicPr>
+          <p:nvPr>
+            <p:ph idx="1"/>
+          </p:nvPr>
+        </p:nvPicPr>
+        <p:blipFill>
+          <a:blip r:embed="rId2">
+            <a:extLst>
+              <a:ext uri="{28A0092B-C50C-407E-A947-70E740481C1C}">
+                <a14:useLocalDpi xmlns:a14="http://schemas.microsoft.com/office/drawing/2010/main" val="0"/>
+              </a:ext>
+            </a:extLst>
+          </a:blip>
+          <a:stretch>
+            <a:fillRect/>
+          </a:stretch>
+        </p:blipFill>
+        <p:spPr>
+          <a:xfrm>
+            <a:off x="1711099" y="2045393"/>
+            <a:ext cx="8769801" cy="3911801"/>
+          </a:xfrm>
+        </p:spPr>
+      </p:pic>
+      <p:sp>
+        <p:nvSpPr>
+          <p:cNvPr id="4" name="מציין מיקום של תאריך 3">
+            <a:extLst>
+              <a:ext uri="{FF2B5EF4-FFF2-40B4-BE49-F238E27FC236}">
+                <a16:creationId xmlns:a16="http://schemas.microsoft.com/office/drawing/2014/main" id="{0A1F7D28-A39D-47D2-B455-E3138375E5DA}"/>
+              </a:ext>
+            </a:extLst>
+          </p:cNvPr>
+          <p:cNvSpPr>
+            <a:spLocks noGrp="1"/>
+          </p:cNvSpPr>
+          <p:nvPr>
+            <p:ph type="dt" sz="half" idx="10"/>
+          </p:nvPr>
+        </p:nvSpPr>
+        <p:spPr>
+          <a:xfrm>
+            <a:off x="8610600" y="365125"/>
+            <a:ext cx="2743200" cy="365125"/>
+          </a:xfrm>
+        </p:spPr>
+        <p:txBody>
+          <a:bodyPr/>
+          <a:lstStyle/>
+          <a:p>
+            <a:r>
+              <a:rPr lang="he-IL" dirty="0"/>
+              <a:t>בס"ד</a:t>
+            </a:r>
+          </a:p>
+        </p:txBody>
+      </p:sp>
+    </p:spTree>
+    <p:extLst>
+      <p:ext uri="{BB962C8B-B14F-4D97-AF65-F5344CB8AC3E}">
+        <p14:creationId xmlns:p14="http://schemas.microsoft.com/office/powerpoint/2010/main" val="914275699"/>
+      </p:ext>
+    </p:extLst>
+  </p:cSld>
+  <p:clrMapOvr>
+    <a:masterClrMapping/>
+  </p:clrMapOvr>
+</p:sld>
+</file>
+
+<file path=ppt/slides/slide14.xml><?xml version="1.0" encoding="utf-8"?>
+<p:sld xmlns:a="http://schemas.openxmlformats.org/drawingml/2006/main" xmlns:r="http://schemas.openxmlformats.org/officeDocument/2006/relationships" xmlns:p="http://schemas.openxmlformats.org/presentationml/2006/main">
+  <p:cSld>
+    <p:spTree>
+      <p:nvGrpSpPr>
+        <p:cNvPr id="1" name=""/>
+        <p:cNvGrpSpPr/>
+        <p:nvPr/>
+      </p:nvGrpSpPr>
+      <p:grpSpPr>
+        <a:xfrm>
+          <a:off x="0" y="0"/>
+          <a:ext cx="0" cy="0"/>
+          <a:chOff x="0" y="0"/>
+          <a:chExt cx="0" cy="0"/>
+        </a:xfrm>
+      </p:grpSpPr>
+      <p:sp>
+        <p:nvSpPr>
+          <p:cNvPr id="2" name="כותרת 1">
+            <a:extLst>
+              <a:ext uri="{FF2B5EF4-FFF2-40B4-BE49-F238E27FC236}">
+                <a16:creationId xmlns:a16="http://schemas.microsoft.com/office/drawing/2014/main" id="{E892D1CA-3639-4528-AD17-6A167534B2F0}"/>
+              </a:ext>
+            </a:extLst>
+          </p:cNvPr>
+          <p:cNvSpPr>
+            <a:spLocks noGrp="1"/>
+          </p:cNvSpPr>
+          <p:nvPr>
+            <p:ph type="title"/>
+          </p:nvPr>
+        </p:nvSpPr>
+        <p:spPr/>
+        <p:txBody>
+          <a:bodyPr/>
+          <a:lstStyle/>
+          <a:p>
+            <a:endParaRPr lang="he-IL"/>
+          </a:p>
+        </p:txBody>
+      </p:sp>
+      <p:pic>
+        <p:nvPicPr>
+          <p:cNvPr id="6" name="מציין מיקום תוכן 5">
+            <a:extLst>
+              <a:ext uri="{FF2B5EF4-FFF2-40B4-BE49-F238E27FC236}">
+                <a16:creationId xmlns:a16="http://schemas.microsoft.com/office/drawing/2014/main" id="{51496A71-7033-4783-9C3A-AD770D139F3A}"/>
+              </a:ext>
+            </a:extLst>
+          </p:cNvPr>
+          <p:cNvPicPr>
+            <a:picLocks noGrp="1" noChangeAspect="1"/>
+          </p:cNvPicPr>
+          <p:nvPr>
+            <p:ph idx="1"/>
+          </p:nvPr>
+        </p:nvPicPr>
+        <p:blipFill>
+          <a:blip r:embed="rId2">
+            <a:extLst>
+              <a:ext uri="{28A0092B-C50C-407E-A947-70E740481C1C}">
+                <a14:useLocalDpi xmlns:a14="http://schemas.microsoft.com/office/drawing/2010/main" val="0"/>
+              </a:ext>
+            </a:extLst>
+          </a:blip>
+          <a:stretch>
+            <a:fillRect/>
+          </a:stretch>
+        </p:blipFill>
+        <p:spPr>
+          <a:xfrm>
+            <a:off x="1768252" y="2502617"/>
+            <a:ext cx="8655495" cy="2997354"/>
+          </a:xfrm>
+        </p:spPr>
+      </p:pic>
+      <p:sp>
+        <p:nvSpPr>
+          <p:cNvPr id="4" name="מציין מיקום של תאריך 3">
+            <a:extLst>
+              <a:ext uri="{FF2B5EF4-FFF2-40B4-BE49-F238E27FC236}">
+                <a16:creationId xmlns:a16="http://schemas.microsoft.com/office/drawing/2014/main" id="{3D6FBC32-1866-49CD-B783-10119E370985}"/>
+              </a:ext>
+            </a:extLst>
+          </p:cNvPr>
+          <p:cNvSpPr>
+            <a:spLocks noGrp="1"/>
+          </p:cNvSpPr>
+          <p:nvPr>
+            <p:ph type="dt" sz="half" idx="10"/>
+          </p:nvPr>
+        </p:nvSpPr>
+        <p:spPr>
+          <a:xfrm>
+            <a:off x="8610600" y="365125"/>
+            <a:ext cx="2743200" cy="365125"/>
+          </a:xfrm>
+        </p:spPr>
+        <p:txBody>
+          <a:bodyPr/>
+          <a:lstStyle/>
+          <a:p>
+            <a:r>
+              <a:rPr lang="he-IL" dirty="0"/>
+              <a:t>בס"ד</a:t>
+            </a:r>
+          </a:p>
+        </p:txBody>
+      </p:sp>
+    </p:spTree>
+    <p:extLst>
+      <p:ext uri="{BB962C8B-B14F-4D97-AF65-F5344CB8AC3E}">
+        <p14:creationId xmlns:p14="http://schemas.microsoft.com/office/powerpoint/2010/main" val="206774896"/>
+      </p:ext>
+    </p:extLst>
+  </p:cSld>
+  <p:clrMapOvr>
+    <a:masterClrMapping/>
+  </p:clrMapOvr>
+</p:sld>
+</file>
+
+<file path=ppt/slides/slide15.xml><?xml version="1.0" encoding="utf-8"?>
+<p:sld xmlns:a="http://schemas.openxmlformats.org/drawingml/2006/main" xmlns:r="http://schemas.openxmlformats.org/officeDocument/2006/relationships" xmlns:p="http://schemas.openxmlformats.org/presentationml/2006/main">
+  <p:cSld>
+    <p:spTree>
+      <p:nvGrpSpPr>
+        <p:cNvPr id="1" name=""/>
+        <p:cNvGrpSpPr/>
+        <p:nvPr/>
+      </p:nvGrpSpPr>
+      <p:grpSpPr>
+        <a:xfrm>
+          <a:off x="0" y="0"/>
+          <a:ext cx="0" cy="0"/>
+          <a:chOff x="0" y="0"/>
+          <a:chExt cx="0" cy="0"/>
+        </a:xfrm>
+      </p:grpSpPr>
+      <p:sp>
+        <p:nvSpPr>
+          <p:cNvPr id="2" name="כותרת 1">
+            <a:extLst>
+              <a:ext uri="{FF2B5EF4-FFF2-40B4-BE49-F238E27FC236}">
+                <a16:creationId xmlns:a16="http://schemas.microsoft.com/office/drawing/2014/main" id="{FCCF9D9D-817C-4548-86E9-B8D04E798EB8}"/>
+              </a:ext>
+            </a:extLst>
+          </p:cNvPr>
+          <p:cNvSpPr>
+            <a:spLocks noGrp="1"/>
+          </p:cNvSpPr>
+          <p:nvPr>
+            <p:ph type="title"/>
+          </p:nvPr>
+        </p:nvSpPr>
+        <p:spPr/>
+        <p:txBody>
+          <a:bodyPr/>
+          <a:lstStyle/>
+          <a:p>
+            <a:endParaRPr lang="he-IL"/>
+          </a:p>
+        </p:txBody>
+      </p:sp>
+      <p:pic>
+        <p:nvPicPr>
+          <p:cNvPr id="6" name="מציין מיקום תוכן 5">
+            <a:extLst>
+              <a:ext uri="{FF2B5EF4-FFF2-40B4-BE49-F238E27FC236}">
+                <a16:creationId xmlns:a16="http://schemas.microsoft.com/office/drawing/2014/main" id="{36B2693F-A80B-4AD3-A80B-AF907EDF3BE0}"/>
+              </a:ext>
+            </a:extLst>
+          </p:cNvPr>
+          <p:cNvPicPr>
+            <a:picLocks noGrp="1" noChangeAspect="1"/>
+          </p:cNvPicPr>
+          <p:nvPr>
+            <p:ph idx="1"/>
+          </p:nvPr>
+        </p:nvPicPr>
+        <p:blipFill>
+          <a:blip r:embed="rId2">
+            <a:extLst>
+              <a:ext uri="{28A0092B-C50C-407E-A947-70E740481C1C}">
+                <a14:useLocalDpi xmlns:a14="http://schemas.microsoft.com/office/drawing/2010/main" val="0"/>
+              </a:ext>
+            </a:extLst>
+          </a:blip>
+          <a:stretch>
+            <a:fillRect/>
+          </a:stretch>
+        </p:blipFill>
+        <p:spPr>
+          <a:xfrm>
+            <a:off x="1853982" y="2200976"/>
+            <a:ext cx="9163746" cy="3889105"/>
+          </a:xfrm>
+        </p:spPr>
+      </p:pic>
+      <p:sp>
+        <p:nvSpPr>
+          <p:cNvPr id="4" name="מציין מיקום של תאריך 3">
+            <a:extLst>
+              <a:ext uri="{FF2B5EF4-FFF2-40B4-BE49-F238E27FC236}">
+                <a16:creationId xmlns:a16="http://schemas.microsoft.com/office/drawing/2014/main" id="{CF2E3FBE-1411-4F6B-81DF-114FA636AB3F}"/>
+              </a:ext>
+            </a:extLst>
+          </p:cNvPr>
+          <p:cNvSpPr>
+            <a:spLocks noGrp="1"/>
+          </p:cNvSpPr>
+          <p:nvPr>
+            <p:ph type="dt" sz="half" idx="10"/>
+          </p:nvPr>
+        </p:nvSpPr>
+        <p:spPr>
+          <a:xfrm>
+            <a:off x="8610600" y="365125"/>
+            <a:ext cx="2743200" cy="365125"/>
+          </a:xfrm>
+        </p:spPr>
+        <p:txBody>
+          <a:bodyPr/>
+          <a:lstStyle/>
+          <a:p>
+            <a:r>
+              <a:rPr lang="he-IL" dirty="0"/>
+              <a:t>בס"ד</a:t>
+            </a:r>
+          </a:p>
+        </p:txBody>
+      </p:sp>
+    </p:spTree>
+    <p:extLst>
+      <p:ext uri="{BB962C8B-B14F-4D97-AF65-F5344CB8AC3E}">
+        <p14:creationId xmlns:p14="http://schemas.microsoft.com/office/powerpoint/2010/main" val="536972207"/>
       </p:ext>
     </p:extLst>
   </p:cSld>

</xml_diff>